<commit_message>
Swapped two Control blocks.
</commit_message>
<xml_diff>
--- a/images/arch.pptx
+++ b/images/arch.pptx
@@ -17,6 +17,7 @@
     <p:sldId id="267" r:id="rId11"/>
     <p:sldId id="268" r:id="rId12"/>
     <p:sldId id="269" r:id="rId13"/>
+    <p:sldId id="270" r:id="rId14"/>
   </p:sldIdLst>
   <p:sldSz cx="12192000" cy="6858000"/>
   <p:notesSz cx="6858000" cy="9144000"/>
@@ -9019,6 +9020,1489 @@
 </p:sld>
 </file>
 
+<file path=ppt/slides/slide13.xml><?xml version="1.0" encoding="utf-8"?>
+<p:sld xmlns:a="http://schemas.openxmlformats.org/drawingml/2006/main" xmlns:r="http://schemas.openxmlformats.org/officeDocument/2006/relationships" xmlns:p="http://schemas.openxmlformats.org/presentationml/2006/main">
+  <p:cSld>
+    <p:spTree>
+      <p:nvGrpSpPr>
+        <p:cNvPr id="1" name=""/>
+        <p:cNvGrpSpPr/>
+        <p:nvPr/>
+      </p:nvGrpSpPr>
+      <p:grpSpPr>
+        <a:xfrm>
+          <a:off x="0" y="0"/>
+          <a:ext cx="0" cy="0"/>
+          <a:chOff x="0" y="0"/>
+          <a:chExt cx="0" cy="0"/>
+        </a:xfrm>
+      </p:grpSpPr>
+      <p:grpSp>
+        <p:nvGrpSpPr>
+          <p:cNvPr id="8" name="Group 7"/>
+          <p:cNvGrpSpPr/>
+          <p:nvPr/>
+        </p:nvGrpSpPr>
+        <p:grpSpPr>
+          <a:xfrm>
+            <a:off x="2479927" y="-279775"/>
+            <a:ext cx="4010811" cy="6847899"/>
+            <a:chOff x="2479927" y="-279775"/>
+            <a:chExt cx="4010811" cy="6847899"/>
+          </a:xfrm>
+        </p:grpSpPr>
+        <p:sp>
+          <p:nvSpPr>
+            <p:cNvPr id="44" name="Block Arc 43"/>
+            <p:cNvSpPr/>
+            <p:nvPr/>
+          </p:nvSpPr>
+          <p:spPr>
+            <a:xfrm flipH="1">
+              <a:off x="2593762" y="-245045"/>
+              <a:ext cx="3797142" cy="4114800"/>
+            </a:xfrm>
+            <a:prstGeom prst="blockArc">
+              <a:avLst>
+                <a:gd name="adj1" fmla="val 10800000"/>
+                <a:gd name="adj2" fmla="val 21594672"/>
+                <a:gd name="adj3" fmla="val 27145"/>
+              </a:avLst>
+            </a:prstGeom>
+            <a:solidFill>
+              <a:srgbClr val="00B0F0"/>
+            </a:solidFill>
+            <a:ln w="38100">
+              <a:solidFill>
+                <a:schemeClr val="tx1"/>
+              </a:solidFill>
+            </a:ln>
+          </p:spPr>
+          <p:style>
+            <a:lnRef idx="2">
+              <a:schemeClr val="accent1">
+                <a:shade val="50000"/>
+              </a:schemeClr>
+            </a:lnRef>
+            <a:fillRef idx="1">
+              <a:schemeClr val="accent1"/>
+            </a:fillRef>
+            <a:effectRef idx="0">
+              <a:schemeClr val="accent1"/>
+            </a:effectRef>
+            <a:fontRef idx="minor">
+              <a:schemeClr val="lt1"/>
+            </a:fontRef>
+          </p:style>
+          <p:txBody>
+            <a:bodyPr rtlCol="0" anchor="ctr"/>
+            <a:lstStyle/>
+            <a:p>
+              <a:pPr algn="r"/>
+              <a:endParaRPr lang="en-US" sz="1200" dirty="0">
+                <a:solidFill>
+                  <a:schemeClr val="tx1"/>
+                </a:solidFill>
+              </a:endParaRPr>
+            </a:p>
+          </p:txBody>
+        </p:sp>
+        <p:grpSp>
+          <p:nvGrpSpPr>
+            <p:cNvPr id="4" name="Group 3"/>
+            <p:cNvGrpSpPr/>
+            <p:nvPr/>
+          </p:nvGrpSpPr>
+          <p:grpSpPr>
+            <a:xfrm>
+              <a:off x="2479927" y="-279775"/>
+              <a:ext cx="4010811" cy="6847899"/>
+              <a:chOff x="2479927" y="-279775"/>
+              <a:chExt cx="4010811" cy="6847899"/>
+            </a:xfrm>
+          </p:grpSpPr>
+          <p:sp>
+            <p:nvSpPr>
+              <p:cNvPr id="5" name="Block Arc 4"/>
+              <p:cNvSpPr/>
+              <p:nvPr/>
+            </p:nvSpPr>
+            <p:spPr>
+              <a:xfrm flipH="1">
+                <a:off x="2612414" y="-279775"/>
+                <a:ext cx="3736692" cy="3690347"/>
+              </a:xfrm>
+              <a:prstGeom prst="blockArc">
+                <a:avLst>
+                  <a:gd name="adj1" fmla="val 14265485"/>
+                  <a:gd name="adj2" fmla="val 18065906"/>
+                  <a:gd name="adj3" fmla="val 31874"/>
+                </a:avLst>
+              </a:prstGeom>
+              <a:solidFill>
+                <a:srgbClr val="00B0F0"/>
+              </a:solidFill>
+              <a:ln w="38100">
+                <a:solidFill>
+                  <a:schemeClr val="tx1"/>
+                </a:solidFill>
+              </a:ln>
+            </p:spPr>
+            <p:style>
+              <a:lnRef idx="2">
+                <a:schemeClr val="accent1">
+                  <a:shade val="50000"/>
+                </a:schemeClr>
+              </a:lnRef>
+              <a:fillRef idx="1">
+                <a:schemeClr val="accent1"/>
+              </a:fillRef>
+              <a:effectRef idx="0">
+                <a:schemeClr val="accent1"/>
+              </a:effectRef>
+              <a:fontRef idx="minor">
+                <a:schemeClr val="lt1"/>
+              </a:fontRef>
+            </p:style>
+            <p:txBody>
+              <a:bodyPr rtlCol="0" anchor="ctr"/>
+              <a:lstStyle/>
+              <a:p>
+                <a:pPr algn="ctr"/>
+                <a:endParaRPr lang="en-US" sz="1200" dirty="0">
+                  <a:solidFill>
+                    <a:schemeClr val="tx1"/>
+                  </a:solidFill>
+                </a:endParaRPr>
+              </a:p>
+            </p:txBody>
+          </p:sp>
+          <p:sp>
+            <p:nvSpPr>
+              <p:cNvPr id="9" name="Rounded Rectangle 8"/>
+              <p:cNvSpPr/>
+              <p:nvPr/>
+            </p:nvSpPr>
+            <p:spPr>
+              <a:xfrm>
+                <a:off x="2481289" y="1806030"/>
+                <a:ext cx="1251751" cy="250795"/>
+              </a:xfrm>
+              <a:prstGeom prst="roundRect">
+                <a:avLst/>
+              </a:prstGeom>
+              <a:ln w="38100"/>
+            </p:spPr>
+            <p:style>
+              <a:lnRef idx="2">
+                <a:schemeClr val="dk1"/>
+              </a:lnRef>
+              <a:fillRef idx="1">
+                <a:schemeClr val="lt1"/>
+              </a:fillRef>
+              <a:effectRef idx="0">
+                <a:schemeClr val="dk1"/>
+              </a:effectRef>
+              <a:fontRef idx="minor">
+                <a:schemeClr val="dk1"/>
+              </a:fontRef>
+            </p:style>
+            <p:txBody>
+              <a:bodyPr rtlCol="0" anchor="ctr"/>
+              <a:lstStyle/>
+              <a:p>
+                <a:pPr algn="ctr"/>
+                <a:endParaRPr lang="en-US" sz="1200">
+                  <a:solidFill>
+                    <a:schemeClr val="tx1"/>
+                  </a:solidFill>
+                </a:endParaRPr>
+              </a:p>
+            </p:txBody>
+          </p:sp>
+          <p:sp>
+            <p:nvSpPr>
+              <p:cNvPr id="10" name="Rectangle 9"/>
+              <p:cNvSpPr/>
+              <p:nvPr/>
+            </p:nvSpPr>
+            <p:spPr>
+              <a:xfrm>
+                <a:off x="2595168" y="2063482"/>
+                <a:ext cx="1029810" cy="3835154"/>
+              </a:xfrm>
+              <a:prstGeom prst="rect">
+                <a:avLst/>
+              </a:prstGeom>
+              <a:solidFill>
+                <a:schemeClr val="accent6"/>
+              </a:solidFill>
+              <a:ln w="38100"/>
+            </p:spPr>
+            <p:style>
+              <a:lnRef idx="2">
+                <a:schemeClr val="dk1"/>
+              </a:lnRef>
+              <a:fillRef idx="1">
+                <a:schemeClr val="lt1"/>
+              </a:fillRef>
+              <a:effectRef idx="0">
+                <a:schemeClr val="dk1"/>
+              </a:effectRef>
+              <a:fontRef idx="minor">
+                <a:schemeClr val="dk1"/>
+              </a:fontRef>
+            </p:style>
+            <p:txBody>
+              <a:bodyPr rtlCol="0" anchor="ctr"/>
+              <a:lstStyle/>
+              <a:p>
+                <a:pPr algn="ctr"/>
+                <a:endParaRPr lang="en-US" sz="1200">
+                  <a:solidFill>
+                    <a:schemeClr val="tx1"/>
+                  </a:solidFill>
+                </a:endParaRPr>
+              </a:p>
+            </p:txBody>
+          </p:sp>
+          <p:sp>
+            <p:nvSpPr>
+              <p:cNvPr id="11" name="Rounded Rectangle 10"/>
+              <p:cNvSpPr/>
+              <p:nvPr/>
+            </p:nvSpPr>
+            <p:spPr>
+              <a:xfrm>
+                <a:off x="5238986" y="1806029"/>
+                <a:ext cx="1251751" cy="250795"/>
+              </a:xfrm>
+              <a:prstGeom prst="roundRect">
+                <a:avLst/>
+              </a:prstGeom>
+              <a:ln w="38100"/>
+            </p:spPr>
+            <p:style>
+              <a:lnRef idx="2">
+                <a:schemeClr val="dk1"/>
+              </a:lnRef>
+              <a:fillRef idx="1">
+                <a:schemeClr val="lt1"/>
+              </a:fillRef>
+              <a:effectRef idx="0">
+                <a:schemeClr val="dk1"/>
+              </a:effectRef>
+              <a:fontRef idx="minor">
+                <a:schemeClr val="dk1"/>
+              </a:fontRef>
+            </p:style>
+            <p:txBody>
+              <a:bodyPr rtlCol="0" anchor="ctr"/>
+              <a:lstStyle/>
+              <a:p>
+                <a:pPr algn="ctr"/>
+                <a:endParaRPr lang="en-US" sz="1200">
+                  <a:solidFill>
+                    <a:schemeClr val="tx1"/>
+                  </a:solidFill>
+                </a:endParaRPr>
+              </a:p>
+            </p:txBody>
+          </p:sp>
+          <p:sp>
+            <p:nvSpPr>
+              <p:cNvPr id="22" name="Rectangle 21"/>
+              <p:cNvSpPr/>
+              <p:nvPr/>
+            </p:nvSpPr>
+            <p:spPr>
+              <a:xfrm>
+                <a:off x="2595168" y="2056824"/>
+                <a:ext cx="1029810" cy="960120"/>
+              </a:xfrm>
+              <a:prstGeom prst="rect">
+                <a:avLst/>
+              </a:prstGeom>
+              <a:noFill/>
+              <a:ln w="38100"/>
+            </p:spPr>
+            <p:style>
+              <a:lnRef idx="2">
+                <a:schemeClr val="dk1"/>
+              </a:lnRef>
+              <a:fillRef idx="1">
+                <a:schemeClr val="lt1"/>
+              </a:fillRef>
+              <a:effectRef idx="0">
+                <a:schemeClr val="dk1"/>
+              </a:effectRef>
+              <a:fontRef idx="minor">
+                <a:schemeClr val="dk1"/>
+              </a:fontRef>
+            </p:style>
+            <p:txBody>
+              <a:bodyPr rtlCol="0" anchor="ctr"/>
+              <a:lstStyle/>
+              <a:p>
+                <a:pPr algn="ctr"/>
+                <a:endParaRPr lang="en-US" sz="1200">
+                  <a:solidFill>
+                    <a:schemeClr val="tx1"/>
+                  </a:solidFill>
+                </a:endParaRPr>
+              </a:p>
+            </p:txBody>
+          </p:sp>
+          <p:sp>
+            <p:nvSpPr>
+              <p:cNvPr id="23" name="Rectangle 22"/>
+              <p:cNvSpPr/>
+              <p:nvPr/>
+            </p:nvSpPr>
+            <p:spPr>
+              <a:xfrm>
+                <a:off x="2595168" y="3016944"/>
+                <a:ext cx="1029810" cy="960120"/>
+              </a:xfrm>
+              <a:prstGeom prst="rect">
+                <a:avLst/>
+              </a:prstGeom>
+              <a:noFill/>
+              <a:ln w="38100"/>
+            </p:spPr>
+            <p:style>
+              <a:lnRef idx="2">
+                <a:schemeClr val="dk1"/>
+              </a:lnRef>
+              <a:fillRef idx="1">
+                <a:schemeClr val="lt1"/>
+              </a:fillRef>
+              <a:effectRef idx="0">
+                <a:schemeClr val="dk1"/>
+              </a:effectRef>
+              <a:fontRef idx="minor">
+                <a:schemeClr val="dk1"/>
+              </a:fontRef>
+            </p:style>
+            <p:txBody>
+              <a:bodyPr rtlCol="0" anchor="ctr"/>
+              <a:lstStyle/>
+              <a:p>
+                <a:pPr algn="ctr"/>
+                <a:endParaRPr lang="en-US" sz="1200">
+                  <a:solidFill>
+                    <a:schemeClr val="tx1"/>
+                  </a:solidFill>
+                </a:endParaRPr>
+              </a:p>
+            </p:txBody>
+          </p:sp>
+          <p:sp>
+            <p:nvSpPr>
+              <p:cNvPr id="24" name="Rectangle 23"/>
+              <p:cNvSpPr/>
+              <p:nvPr/>
+            </p:nvSpPr>
+            <p:spPr>
+              <a:xfrm>
+                <a:off x="2595168" y="3977730"/>
+                <a:ext cx="1029810" cy="960120"/>
+              </a:xfrm>
+              <a:prstGeom prst="rect">
+                <a:avLst/>
+              </a:prstGeom>
+              <a:noFill/>
+              <a:ln w="38100"/>
+            </p:spPr>
+            <p:style>
+              <a:lnRef idx="2">
+                <a:schemeClr val="dk1"/>
+              </a:lnRef>
+              <a:fillRef idx="1">
+                <a:schemeClr val="lt1"/>
+              </a:fillRef>
+              <a:effectRef idx="0">
+                <a:schemeClr val="dk1"/>
+              </a:effectRef>
+              <a:fontRef idx="minor">
+                <a:schemeClr val="dk1"/>
+              </a:fontRef>
+            </p:style>
+            <p:txBody>
+              <a:bodyPr rtlCol="0" anchor="ctr"/>
+              <a:lstStyle/>
+              <a:p>
+                <a:pPr algn="ctr"/>
+                <a:endParaRPr lang="en-US" sz="1200">
+                  <a:solidFill>
+                    <a:schemeClr val="tx1"/>
+                  </a:solidFill>
+                </a:endParaRPr>
+              </a:p>
+            </p:txBody>
+          </p:sp>
+          <p:sp>
+            <p:nvSpPr>
+              <p:cNvPr id="25" name="Rectangle 24"/>
+              <p:cNvSpPr/>
+              <p:nvPr/>
+            </p:nvSpPr>
+            <p:spPr>
+              <a:xfrm>
+                <a:off x="2595168" y="4938849"/>
+                <a:ext cx="1029810" cy="960120"/>
+              </a:xfrm>
+              <a:prstGeom prst="rect">
+                <a:avLst/>
+              </a:prstGeom>
+              <a:noFill/>
+              <a:ln w="38100"/>
+            </p:spPr>
+            <p:style>
+              <a:lnRef idx="2">
+                <a:schemeClr val="dk1"/>
+              </a:lnRef>
+              <a:fillRef idx="1">
+                <a:schemeClr val="lt1"/>
+              </a:fillRef>
+              <a:effectRef idx="0">
+                <a:schemeClr val="dk1"/>
+              </a:effectRef>
+              <a:fontRef idx="minor">
+                <a:schemeClr val="dk1"/>
+              </a:fontRef>
+            </p:style>
+            <p:txBody>
+              <a:bodyPr rtlCol="0" anchor="ctr"/>
+              <a:lstStyle/>
+              <a:p>
+                <a:pPr algn="ctr"/>
+                <a:endParaRPr lang="en-US" sz="1200">
+                  <a:solidFill>
+                    <a:schemeClr val="tx1"/>
+                  </a:solidFill>
+                </a:endParaRPr>
+              </a:p>
+            </p:txBody>
+          </p:sp>
+          <p:sp>
+            <p:nvSpPr>
+              <p:cNvPr id="26" name="TextBox 25"/>
+              <p:cNvSpPr txBox="1"/>
+              <p:nvPr/>
+            </p:nvSpPr>
+            <p:spPr>
+              <a:xfrm>
+                <a:off x="2687257" y="2369449"/>
+                <a:ext cx="859477" cy="276999"/>
+              </a:xfrm>
+              <a:prstGeom prst="rect">
+                <a:avLst/>
+              </a:prstGeom>
+              <a:noFill/>
+            </p:spPr>
+            <p:txBody>
+              <a:bodyPr wrap="square" rtlCol="0">
+                <a:spAutoFit/>
+              </a:bodyPr>
+              <a:lstStyle/>
+              <a:p>
+                <a:pPr algn="ctr"/>
+                <a:r>
+                  <a:rPr lang="en-US" sz="1200" b="1" dirty="0" smtClean="0"/>
+                  <a:t>Hardware</a:t>
+                </a:r>
+                <a:endParaRPr lang="en-US" sz="1200" b="1" dirty="0"/>
+              </a:p>
+            </p:txBody>
+          </p:sp>
+          <p:sp>
+            <p:nvSpPr>
+              <p:cNvPr id="27" name="TextBox 26"/>
+              <p:cNvSpPr txBox="1"/>
+              <p:nvPr/>
+            </p:nvSpPr>
+            <p:spPr>
+              <a:xfrm>
+                <a:off x="2706754" y="3354084"/>
+                <a:ext cx="806637" cy="276999"/>
+              </a:xfrm>
+              <a:prstGeom prst="rect">
+                <a:avLst/>
+              </a:prstGeom>
+              <a:noFill/>
+            </p:spPr>
+            <p:txBody>
+              <a:bodyPr wrap="square" rtlCol="0">
+                <a:spAutoFit/>
+              </a:bodyPr>
+              <a:lstStyle/>
+              <a:p>
+                <a:pPr algn="ctr"/>
+                <a:r>
+                  <a:rPr lang="en-US" sz="1200" b="1" dirty="0" smtClean="0"/>
+                  <a:t>Software</a:t>
+                </a:r>
+                <a:endParaRPr lang="en-US" sz="1200" b="1" dirty="0"/>
+              </a:p>
+            </p:txBody>
+          </p:sp>
+          <p:sp>
+            <p:nvSpPr>
+              <p:cNvPr id="28" name="TextBox 27"/>
+              <p:cNvSpPr txBox="1"/>
+              <p:nvPr/>
+            </p:nvSpPr>
+            <p:spPr>
+              <a:xfrm>
+                <a:off x="2757112" y="4309484"/>
+                <a:ext cx="707398" cy="276999"/>
+              </a:xfrm>
+              <a:prstGeom prst="rect">
+                <a:avLst/>
+              </a:prstGeom>
+              <a:noFill/>
+            </p:spPr>
+            <p:txBody>
+              <a:bodyPr wrap="square" rtlCol="0">
+                <a:spAutoFit/>
+              </a:bodyPr>
+              <a:lstStyle/>
+              <a:p>
+                <a:pPr algn="ctr"/>
+                <a:r>
+                  <a:rPr lang="en-US" sz="1200" b="1" dirty="0" smtClean="0"/>
+                  <a:t>Storage</a:t>
+                </a:r>
+                <a:endParaRPr lang="en-US" sz="1200" b="1" dirty="0"/>
+              </a:p>
+            </p:txBody>
+          </p:sp>
+          <p:sp>
+            <p:nvSpPr>
+              <p:cNvPr id="29" name="TextBox 28"/>
+              <p:cNvSpPr txBox="1"/>
+              <p:nvPr/>
+            </p:nvSpPr>
+            <p:spPr>
+              <a:xfrm>
+                <a:off x="2741158" y="5271600"/>
+                <a:ext cx="751674" cy="276999"/>
+              </a:xfrm>
+              <a:prstGeom prst="rect">
+                <a:avLst/>
+              </a:prstGeom>
+              <a:noFill/>
+            </p:spPr>
+            <p:txBody>
+              <a:bodyPr wrap="square" rtlCol="0">
+                <a:spAutoFit/>
+              </a:bodyPr>
+              <a:lstStyle/>
+              <a:p>
+                <a:pPr algn="ctr"/>
+                <a:r>
+                  <a:rPr lang="en-US" sz="1200" b="1" dirty="0" smtClean="0"/>
+                  <a:t>Services</a:t>
+                </a:r>
+                <a:endParaRPr lang="en-US" sz="1200" b="1" dirty="0"/>
+              </a:p>
+            </p:txBody>
+          </p:sp>
+          <p:sp>
+            <p:nvSpPr>
+              <p:cNvPr id="30" name="TextBox 29"/>
+              <p:cNvSpPr txBox="1"/>
+              <p:nvPr/>
+            </p:nvSpPr>
+            <p:spPr>
+              <a:xfrm>
+                <a:off x="4937211" y="3103959"/>
+                <a:ext cx="403828" cy="1745543"/>
+              </a:xfrm>
+              <a:prstGeom prst="rect">
+                <a:avLst/>
+              </a:prstGeom>
+              <a:noFill/>
+            </p:spPr>
+            <p:txBody>
+              <a:bodyPr vert="wordArtVert" wrap="square" rtlCol="0">
+                <a:spAutoFit/>
+              </a:bodyPr>
+              <a:lstStyle/>
+              <a:p>
+                <a:pPr algn="ctr"/>
+                <a:r>
+                  <a:rPr lang="en-US" sz="1200" b="1" dirty="0" smtClean="0"/>
+                  <a:t>Control</a:t>
+                </a:r>
+                <a:endParaRPr lang="en-US" sz="1200" b="1" dirty="0"/>
+              </a:p>
+            </p:txBody>
+          </p:sp>
+          <p:sp>
+            <p:nvSpPr>
+              <p:cNvPr id="31" name="TextBox 30"/>
+              <p:cNvSpPr txBox="1"/>
+              <p:nvPr/>
+            </p:nvSpPr>
+            <p:spPr>
+              <a:xfrm>
+                <a:off x="3636251" y="2742395"/>
+                <a:ext cx="403828" cy="2468672"/>
+              </a:xfrm>
+              <a:prstGeom prst="rect">
+                <a:avLst/>
+              </a:prstGeom>
+              <a:noFill/>
+            </p:spPr>
+            <p:txBody>
+              <a:bodyPr vert="wordArtVert" wrap="square" rtlCol="0">
+                <a:spAutoFit/>
+              </a:bodyPr>
+              <a:lstStyle/>
+              <a:p>
+                <a:pPr algn="ctr"/>
+                <a:r>
+                  <a:rPr lang="en-US" sz="1200" b="1" dirty="0" smtClean="0"/>
+                  <a:t>Technology</a:t>
+                </a:r>
+                <a:endParaRPr lang="en-US" sz="1200" b="1" dirty="0"/>
+              </a:p>
+            </p:txBody>
+          </p:sp>
+          <p:sp>
+            <p:nvSpPr>
+              <p:cNvPr id="32" name="Snip Same Side Corner Rectangle 31"/>
+              <p:cNvSpPr/>
+              <p:nvPr/>
+            </p:nvSpPr>
+            <p:spPr>
+              <a:xfrm>
+                <a:off x="2479928" y="5900416"/>
+                <a:ext cx="4010810" cy="667342"/>
+              </a:xfrm>
+              <a:prstGeom prst="snip2SameRect">
+                <a:avLst>
+                  <a:gd name="adj1" fmla="val 14933"/>
+                  <a:gd name="adj2" fmla="val 0"/>
+                </a:avLst>
+              </a:prstGeom>
+              <a:solidFill>
+                <a:schemeClr val="bg1">
+                  <a:lumMod val="75000"/>
+                </a:schemeClr>
+              </a:solidFill>
+              <a:ln w="38100"/>
+            </p:spPr>
+            <p:style>
+              <a:lnRef idx="2">
+                <a:schemeClr val="dk1"/>
+              </a:lnRef>
+              <a:fillRef idx="1">
+                <a:schemeClr val="lt1"/>
+              </a:fillRef>
+              <a:effectRef idx="0">
+                <a:schemeClr val="dk1"/>
+              </a:effectRef>
+              <a:fontRef idx="minor">
+                <a:schemeClr val="dk1"/>
+              </a:fontRef>
+            </p:style>
+            <p:txBody>
+              <a:bodyPr rtlCol="0" anchor="ctr"/>
+              <a:lstStyle/>
+              <a:p>
+                <a:pPr algn="ctr"/>
+                <a:endParaRPr lang="en-US" sz="1200">
+                  <a:solidFill>
+                    <a:schemeClr val="tx1"/>
+                  </a:solidFill>
+                </a:endParaRPr>
+              </a:p>
+            </p:txBody>
+          </p:sp>
+          <p:sp>
+            <p:nvSpPr>
+              <p:cNvPr id="33" name="Rectangle 32"/>
+              <p:cNvSpPr/>
+              <p:nvPr/>
+            </p:nvSpPr>
+            <p:spPr>
+              <a:xfrm>
+                <a:off x="5146569" y="6014313"/>
+                <a:ext cx="1344168" cy="553708"/>
+              </a:xfrm>
+              <a:prstGeom prst="rect">
+                <a:avLst/>
+              </a:prstGeom>
+              <a:noFill/>
+              <a:ln w="38100">
+                <a:solidFill>
+                  <a:schemeClr val="tx1"/>
+                </a:solidFill>
+              </a:ln>
+            </p:spPr>
+            <p:style>
+              <a:lnRef idx="2">
+                <a:schemeClr val="accent1">
+                  <a:shade val="50000"/>
+                </a:schemeClr>
+              </a:lnRef>
+              <a:fillRef idx="1">
+                <a:schemeClr val="accent1"/>
+              </a:fillRef>
+              <a:effectRef idx="0">
+                <a:schemeClr val="accent1"/>
+              </a:effectRef>
+              <a:fontRef idx="minor">
+                <a:schemeClr val="lt1"/>
+              </a:fontRef>
+            </p:style>
+            <p:txBody>
+              <a:bodyPr rtlCol="0" anchor="ctr"/>
+              <a:lstStyle/>
+              <a:p>
+                <a:pPr algn="ctr"/>
+                <a:endParaRPr lang="en-US" sz="1200">
+                  <a:solidFill>
+                    <a:schemeClr val="tx1"/>
+                  </a:solidFill>
+                </a:endParaRPr>
+              </a:p>
+            </p:txBody>
+          </p:sp>
+          <p:sp>
+            <p:nvSpPr>
+              <p:cNvPr id="34" name="TextBox 33"/>
+              <p:cNvSpPr txBox="1"/>
+              <p:nvPr/>
+            </p:nvSpPr>
+            <p:spPr>
+              <a:xfrm>
+                <a:off x="4094936" y="6060333"/>
+                <a:ext cx="779070" cy="461665"/>
+              </a:xfrm>
+              <a:prstGeom prst="rect">
+                <a:avLst/>
+              </a:prstGeom>
+              <a:noFill/>
+            </p:spPr>
+            <p:txBody>
+              <a:bodyPr wrap="square" rtlCol="0">
+                <a:spAutoFit/>
+              </a:bodyPr>
+              <a:lstStyle/>
+              <a:p>
+                <a:pPr algn="ctr"/>
+                <a:r>
+                  <a:rPr lang="en-US" sz="1200" b="1" dirty="0" smtClean="0"/>
+                  <a:t>Business</a:t>
+                </a:r>
+                <a:br>
+                  <a:rPr lang="en-US" sz="1200" b="1" dirty="0" smtClean="0"/>
+                </a:br>
+                <a:r>
+                  <a:rPr lang="en-US" sz="1200" b="1" dirty="0" smtClean="0"/>
+                  <a:t>Model</a:t>
+                </a:r>
+                <a:endParaRPr lang="en-US" sz="1200" b="1" dirty="0"/>
+              </a:p>
+            </p:txBody>
+          </p:sp>
+          <p:sp>
+            <p:nvSpPr>
+              <p:cNvPr id="35" name="TextBox 34"/>
+              <p:cNvSpPr txBox="1"/>
+              <p:nvPr/>
+            </p:nvSpPr>
+            <p:spPr>
+              <a:xfrm>
+                <a:off x="2682520" y="6147863"/>
+                <a:ext cx="928136" cy="276999"/>
+              </a:xfrm>
+              <a:prstGeom prst="rect">
+                <a:avLst/>
+              </a:prstGeom>
+              <a:noFill/>
+            </p:spPr>
+            <p:txBody>
+              <a:bodyPr wrap="square" rtlCol="0">
+                <a:spAutoFit/>
+              </a:bodyPr>
+              <a:lstStyle/>
+              <a:p>
+                <a:pPr algn="ctr"/>
+                <a:r>
+                  <a:rPr lang="en-US" sz="1200" b="1" dirty="0" smtClean="0"/>
+                  <a:t>Compliance</a:t>
+                </a:r>
+                <a:endParaRPr lang="en-US" sz="1200" b="1" dirty="0"/>
+              </a:p>
+            </p:txBody>
+          </p:sp>
+          <p:sp>
+            <p:nvSpPr>
+              <p:cNvPr id="36" name="TextBox 35"/>
+              <p:cNvSpPr txBox="1"/>
+              <p:nvPr/>
+            </p:nvSpPr>
+            <p:spPr>
+              <a:xfrm>
+                <a:off x="5263541" y="6146760"/>
+                <a:ext cx="1110223" cy="276999"/>
+              </a:xfrm>
+              <a:prstGeom prst="rect">
+                <a:avLst/>
+              </a:prstGeom>
+              <a:noFill/>
+            </p:spPr>
+            <p:txBody>
+              <a:bodyPr wrap="square" rtlCol="0">
+                <a:spAutoFit/>
+              </a:bodyPr>
+              <a:lstStyle/>
+              <a:p>
+                <a:pPr algn="ctr"/>
+                <a:r>
+                  <a:rPr lang="en-US" sz="1200" b="1" dirty="0" smtClean="0"/>
+                  <a:t>Risk</a:t>
+                </a:r>
+                <a:endParaRPr lang="en-US" sz="1200" b="1" dirty="0"/>
+              </a:p>
+            </p:txBody>
+          </p:sp>
+          <p:sp>
+            <p:nvSpPr>
+              <p:cNvPr id="37" name="TextBox 36"/>
+              <p:cNvSpPr txBox="1"/>
+              <p:nvPr/>
+            </p:nvSpPr>
+            <p:spPr>
+              <a:xfrm>
+                <a:off x="3785782" y="1133333"/>
+                <a:ext cx="1389955" cy="276999"/>
+              </a:xfrm>
+              <a:prstGeom prst="rect">
+                <a:avLst/>
+              </a:prstGeom>
+              <a:noFill/>
+            </p:spPr>
+            <p:txBody>
+              <a:bodyPr wrap="square" rtlCol="0">
+                <a:spAutoFit/>
+              </a:bodyPr>
+              <a:lstStyle/>
+              <a:p>
+                <a:pPr algn="ctr"/>
+                <a:r>
+                  <a:rPr lang="en-US" sz="1200" b="1" dirty="0" smtClean="0"/>
+                  <a:t>I n f o r m a t </a:t>
+                </a:r>
+                <a:r>
+                  <a:rPr lang="en-US" sz="1200" b="1" dirty="0" err="1" smtClean="0"/>
+                  <a:t>i</a:t>
+                </a:r>
+                <a:r>
+                  <a:rPr lang="en-US" sz="1200" b="1" dirty="0" smtClean="0"/>
+                  <a:t> o n</a:t>
+                </a:r>
+                <a:endParaRPr lang="en-US" sz="1200" b="1" dirty="0"/>
+              </a:p>
+            </p:txBody>
+          </p:sp>
+          <p:sp>
+            <p:nvSpPr>
+              <p:cNvPr id="38" name="Rectangle 37"/>
+              <p:cNvSpPr/>
+              <p:nvPr/>
+            </p:nvSpPr>
+            <p:spPr>
+              <a:xfrm>
+                <a:off x="3813248" y="6014313"/>
+                <a:ext cx="1335024" cy="553708"/>
+              </a:xfrm>
+              <a:prstGeom prst="rect">
+                <a:avLst/>
+              </a:prstGeom>
+              <a:noFill/>
+              <a:ln w="38100">
+                <a:solidFill>
+                  <a:schemeClr val="tx1"/>
+                </a:solidFill>
+              </a:ln>
+            </p:spPr>
+            <p:style>
+              <a:lnRef idx="2">
+                <a:schemeClr val="accent1">
+                  <a:shade val="50000"/>
+                </a:schemeClr>
+              </a:lnRef>
+              <a:fillRef idx="1">
+                <a:schemeClr val="accent1"/>
+              </a:fillRef>
+              <a:effectRef idx="0">
+                <a:schemeClr val="accent1"/>
+              </a:effectRef>
+              <a:fontRef idx="minor">
+                <a:schemeClr val="lt1"/>
+              </a:fontRef>
+            </p:style>
+            <p:txBody>
+              <a:bodyPr rtlCol="0" anchor="ctr"/>
+              <a:lstStyle/>
+              <a:p>
+                <a:pPr algn="ctr"/>
+                <a:endParaRPr lang="en-US" sz="1200">
+                  <a:solidFill>
+                    <a:schemeClr val="tx1"/>
+                  </a:solidFill>
+                </a:endParaRPr>
+              </a:p>
+            </p:txBody>
+          </p:sp>
+          <p:sp>
+            <p:nvSpPr>
+              <p:cNvPr id="39" name="Rectangle 38"/>
+              <p:cNvSpPr/>
+              <p:nvPr/>
+            </p:nvSpPr>
+            <p:spPr>
+              <a:xfrm>
+                <a:off x="2479927" y="6014416"/>
+                <a:ext cx="1335024" cy="553708"/>
+              </a:xfrm>
+              <a:prstGeom prst="rect">
+                <a:avLst/>
+              </a:prstGeom>
+              <a:noFill/>
+              <a:ln w="38100">
+                <a:solidFill>
+                  <a:schemeClr val="tx1"/>
+                </a:solidFill>
+              </a:ln>
+            </p:spPr>
+            <p:style>
+              <a:lnRef idx="2">
+                <a:schemeClr val="accent1">
+                  <a:shade val="50000"/>
+                </a:schemeClr>
+              </a:lnRef>
+              <a:fillRef idx="1">
+                <a:schemeClr val="accent1"/>
+              </a:fillRef>
+              <a:effectRef idx="0">
+                <a:schemeClr val="accent1"/>
+              </a:effectRef>
+              <a:fontRef idx="minor">
+                <a:schemeClr val="lt1"/>
+              </a:fontRef>
+            </p:style>
+            <p:txBody>
+              <a:bodyPr rtlCol="0" anchor="ctr"/>
+              <a:lstStyle/>
+              <a:p>
+                <a:pPr algn="ctr"/>
+                <a:endParaRPr lang="en-US" sz="1200">
+                  <a:solidFill>
+                    <a:schemeClr val="tx1"/>
+                  </a:solidFill>
+                </a:endParaRPr>
+              </a:p>
+            </p:txBody>
+          </p:sp>
+          <p:sp>
+            <p:nvSpPr>
+              <p:cNvPr id="40" name="TextBox 39"/>
+              <p:cNvSpPr txBox="1"/>
+              <p:nvPr/>
+            </p:nvSpPr>
+            <p:spPr>
+              <a:xfrm>
+                <a:off x="4255736" y="167987"/>
+                <a:ext cx="473193" cy="276999"/>
+              </a:xfrm>
+              <a:prstGeom prst="rect">
+                <a:avLst/>
+              </a:prstGeom>
+              <a:noFill/>
+            </p:spPr>
+            <p:txBody>
+              <a:bodyPr wrap="square" rtlCol="0">
+                <a:spAutoFit/>
+              </a:bodyPr>
+              <a:lstStyle/>
+              <a:p>
+                <a:pPr algn="ctr"/>
+                <a:r>
+                  <a:rPr lang="en-US" sz="1200" b="1" dirty="0" smtClean="0"/>
+                  <a:t>Use</a:t>
+                </a:r>
+                <a:endParaRPr lang="en-US" sz="1200" b="1" dirty="0"/>
+              </a:p>
+            </p:txBody>
+          </p:sp>
+          <p:sp>
+            <p:nvSpPr>
+              <p:cNvPr id="41" name="TextBox 40"/>
+              <p:cNvSpPr txBox="1"/>
+              <p:nvPr/>
+            </p:nvSpPr>
+            <p:spPr>
+              <a:xfrm>
+                <a:off x="5146568" y="944693"/>
+                <a:ext cx="1088128" cy="276999"/>
+              </a:xfrm>
+              <a:prstGeom prst="rect">
+                <a:avLst/>
+              </a:prstGeom>
+              <a:noFill/>
+            </p:spPr>
+            <p:txBody>
+              <a:bodyPr wrap="square" rtlCol="0">
+                <a:spAutoFit/>
+              </a:bodyPr>
+              <a:lstStyle/>
+              <a:p>
+                <a:pPr algn="ctr"/>
+                <a:r>
+                  <a:rPr lang="en-US" sz="1200" b="1" dirty="0" smtClean="0"/>
+                  <a:t>Maintenance</a:t>
+                </a:r>
+                <a:endParaRPr lang="en-US" sz="1200" b="1" dirty="0"/>
+              </a:p>
+            </p:txBody>
+          </p:sp>
+          <p:sp>
+            <p:nvSpPr>
+              <p:cNvPr id="42" name="TextBox 41"/>
+              <p:cNvSpPr txBox="1"/>
+              <p:nvPr/>
+            </p:nvSpPr>
+            <p:spPr>
+              <a:xfrm>
+                <a:off x="2927406" y="944693"/>
+                <a:ext cx="776556" cy="276999"/>
+              </a:xfrm>
+              <a:prstGeom prst="rect">
+                <a:avLst/>
+              </a:prstGeom>
+              <a:noFill/>
+            </p:spPr>
+            <p:txBody>
+              <a:bodyPr wrap="square" rtlCol="0">
+                <a:spAutoFit/>
+              </a:bodyPr>
+              <a:lstStyle/>
+              <a:p>
+                <a:pPr algn="ctr"/>
+                <a:r>
+                  <a:rPr lang="en-US" sz="1200" b="1" dirty="0" smtClean="0"/>
+                  <a:t>Creation</a:t>
+                </a:r>
+                <a:endParaRPr lang="en-US" sz="1200" b="1" dirty="0"/>
+              </a:p>
+            </p:txBody>
+          </p:sp>
+          <p:sp>
+            <p:nvSpPr>
+              <p:cNvPr id="52" name="Rectangle 51"/>
+              <p:cNvSpPr/>
+              <p:nvPr/>
+            </p:nvSpPr>
+            <p:spPr>
+              <a:xfrm>
+                <a:off x="5361095" y="2063149"/>
+                <a:ext cx="1029810" cy="3835154"/>
+              </a:xfrm>
+              <a:prstGeom prst="rect">
+                <a:avLst/>
+              </a:prstGeom>
+              <a:solidFill>
+                <a:srgbClr val="FF5050"/>
+              </a:solidFill>
+              <a:ln w="38100"/>
+            </p:spPr>
+            <p:style>
+              <a:lnRef idx="2">
+                <a:schemeClr val="dk1"/>
+              </a:lnRef>
+              <a:fillRef idx="1">
+                <a:schemeClr val="lt1"/>
+              </a:fillRef>
+              <a:effectRef idx="0">
+                <a:schemeClr val="dk1"/>
+              </a:effectRef>
+              <a:fontRef idx="minor">
+                <a:schemeClr val="dk1"/>
+              </a:fontRef>
+            </p:style>
+            <p:txBody>
+              <a:bodyPr rtlCol="0" anchor="ctr"/>
+              <a:lstStyle/>
+              <a:p>
+                <a:pPr algn="ctr"/>
+                <a:endParaRPr lang="en-US" sz="1200">
+                  <a:solidFill>
+                    <a:schemeClr val="tx1"/>
+                  </a:solidFill>
+                </a:endParaRPr>
+              </a:p>
+            </p:txBody>
+          </p:sp>
+          <p:sp>
+            <p:nvSpPr>
+              <p:cNvPr id="53" name="Rectangle 52"/>
+              <p:cNvSpPr/>
+              <p:nvPr/>
+            </p:nvSpPr>
+            <p:spPr>
+              <a:xfrm>
+                <a:off x="5361095" y="2056491"/>
+                <a:ext cx="1029810" cy="960120"/>
+              </a:xfrm>
+              <a:prstGeom prst="rect">
+                <a:avLst/>
+              </a:prstGeom>
+              <a:noFill/>
+              <a:ln w="38100"/>
+            </p:spPr>
+            <p:style>
+              <a:lnRef idx="2">
+                <a:schemeClr val="dk1"/>
+              </a:lnRef>
+              <a:fillRef idx="1">
+                <a:schemeClr val="lt1"/>
+              </a:fillRef>
+              <a:effectRef idx="0">
+                <a:schemeClr val="dk1"/>
+              </a:effectRef>
+              <a:fontRef idx="minor">
+                <a:schemeClr val="dk1"/>
+              </a:fontRef>
+            </p:style>
+            <p:txBody>
+              <a:bodyPr rtlCol="0" anchor="ctr"/>
+              <a:lstStyle/>
+              <a:p>
+                <a:pPr algn="ctr"/>
+                <a:endParaRPr lang="en-US" sz="1200">
+                  <a:solidFill>
+                    <a:schemeClr val="tx1"/>
+                  </a:solidFill>
+                </a:endParaRPr>
+              </a:p>
+            </p:txBody>
+          </p:sp>
+          <p:sp>
+            <p:nvSpPr>
+              <p:cNvPr id="54" name="Rectangle 53"/>
+              <p:cNvSpPr/>
+              <p:nvPr/>
+            </p:nvSpPr>
+            <p:spPr>
+              <a:xfrm>
+                <a:off x="5361095" y="3016611"/>
+                <a:ext cx="1029810" cy="960120"/>
+              </a:xfrm>
+              <a:prstGeom prst="rect">
+                <a:avLst/>
+              </a:prstGeom>
+              <a:noFill/>
+              <a:ln w="38100"/>
+            </p:spPr>
+            <p:style>
+              <a:lnRef idx="2">
+                <a:schemeClr val="dk1"/>
+              </a:lnRef>
+              <a:fillRef idx="1">
+                <a:schemeClr val="lt1"/>
+              </a:fillRef>
+              <a:effectRef idx="0">
+                <a:schemeClr val="dk1"/>
+              </a:effectRef>
+              <a:fontRef idx="minor">
+                <a:schemeClr val="dk1"/>
+              </a:fontRef>
+            </p:style>
+            <p:txBody>
+              <a:bodyPr rtlCol="0" anchor="ctr"/>
+              <a:lstStyle/>
+              <a:p>
+                <a:pPr algn="ctr"/>
+                <a:endParaRPr lang="en-US" sz="1200">
+                  <a:solidFill>
+                    <a:schemeClr val="tx1"/>
+                  </a:solidFill>
+                </a:endParaRPr>
+              </a:p>
+            </p:txBody>
+          </p:sp>
+          <p:sp>
+            <p:nvSpPr>
+              <p:cNvPr id="55" name="Rectangle 54"/>
+              <p:cNvSpPr/>
+              <p:nvPr/>
+            </p:nvSpPr>
+            <p:spPr>
+              <a:xfrm>
+                <a:off x="5361095" y="3977397"/>
+                <a:ext cx="1029810" cy="960120"/>
+              </a:xfrm>
+              <a:prstGeom prst="rect">
+                <a:avLst/>
+              </a:prstGeom>
+              <a:noFill/>
+              <a:ln w="38100"/>
+            </p:spPr>
+            <p:style>
+              <a:lnRef idx="2">
+                <a:schemeClr val="dk1"/>
+              </a:lnRef>
+              <a:fillRef idx="1">
+                <a:schemeClr val="lt1"/>
+              </a:fillRef>
+              <a:effectRef idx="0">
+                <a:schemeClr val="dk1"/>
+              </a:effectRef>
+              <a:fontRef idx="minor">
+                <a:schemeClr val="dk1"/>
+              </a:fontRef>
+            </p:style>
+            <p:txBody>
+              <a:bodyPr rtlCol="0" anchor="ctr"/>
+              <a:lstStyle/>
+              <a:p>
+                <a:pPr algn="ctr"/>
+                <a:endParaRPr lang="en-US" sz="1200">
+                  <a:solidFill>
+                    <a:schemeClr val="tx1"/>
+                  </a:solidFill>
+                </a:endParaRPr>
+              </a:p>
+            </p:txBody>
+          </p:sp>
+          <p:sp>
+            <p:nvSpPr>
+              <p:cNvPr id="56" name="Rectangle 55"/>
+              <p:cNvSpPr/>
+              <p:nvPr/>
+            </p:nvSpPr>
+            <p:spPr>
+              <a:xfrm>
+                <a:off x="5361095" y="4938516"/>
+                <a:ext cx="1029810" cy="960120"/>
+              </a:xfrm>
+              <a:prstGeom prst="rect">
+                <a:avLst/>
+              </a:prstGeom>
+              <a:noFill/>
+              <a:ln w="38100"/>
+            </p:spPr>
+            <p:style>
+              <a:lnRef idx="2">
+                <a:schemeClr val="dk1"/>
+              </a:lnRef>
+              <a:fillRef idx="1">
+                <a:schemeClr val="lt1"/>
+              </a:fillRef>
+              <a:effectRef idx="0">
+                <a:schemeClr val="dk1"/>
+              </a:effectRef>
+              <a:fontRef idx="minor">
+                <a:schemeClr val="dk1"/>
+              </a:fontRef>
+            </p:style>
+            <p:txBody>
+              <a:bodyPr rtlCol="0" anchor="ctr"/>
+              <a:lstStyle/>
+              <a:p>
+                <a:pPr algn="ctr"/>
+                <a:endParaRPr lang="en-US" sz="1200">
+                  <a:solidFill>
+                    <a:schemeClr val="tx1"/>
+                  </a:solidFill>
+                </a:endParaRPr>
+              </a:p>
+            </p:txBody>
+          </p:sp>
+          <p:sp>
+            <p:nvSpPr>
+              <p:cNvPr id="57" name="TextBox 56"/>
+              <p:cNvSpPr txBox="1"/>
+              <p:nvPr/>
+            </p:nvSpPr>
+            <p:spPr>
+              <a:xfrm>
+                <a:off x="5527041" y="2370032"/>
+                <a:ext cx="697915" cy="276999"/>
+              </a:xfrm>
+              <a:prstGeom prst="rect">
+                <a:avLst/>
+              </a:prstGeom>
+              <a:noFill/>
+            </p:spPr>
+            <p:txBody>
+              <a:bodyPr wrap="square" rtlCol="0">
+                <a:spAutoFit/>
+              </a:bodyPr>
+              <a:lstStyle/>
+              <a:p>
+                <a:pPr algn="ctr"/>
+                <a:r>
+                  <a:rPr lang="en-US" sz="1200" b="1" dirty="0" smtClean="0"/>
+                  <a:t>Security</a:t>
+                </a:r>
+                <a:endParaRPr lang="en-US" sz="1200" b="1" dirty="0"/>
+              </a:p>
+            </p:txBody>
+          </p:sp>
+          <p:sp>
+            <p:nvSpPr>
+              <p:cNvPr id="58" name="TextBox 57"/>
+              <p:cNvSpPr txBox="1"/>
+              <p:nvPr/>
+            </p:nvSpPr>
+            <p:spPr>
+              <a:xfrm>
+                <a:off x="5421846" y="4319715"/>
+                <a:ext cx="904763" cy="276999"/>
+              </a:xfrm>
+              <a:prstGeom prst="rect">
+                <a:avLst/>
+              </a:prstGeom>
+              <a:noFill/>
+            </p:spPr>
+            <p:txBody>
+              <a:bodyPr wrap="square" rtlCol="0">
+                <a:spAutoFit/>
+              </a:bodyPr>
+              <a:lstStyle/>
+              <a:p>
+                <a:pPr algn="ctr"/>
+                <a:r>
+                  <a:rPr lang="en-US" sz="1200" b="1" dirty="0" smtClean="0"/>
+                  <a:t>Availability</a:t>
+                </a:r>
+                <a:endParaRPr lang="en-US" sz="1200" b="1" dirty="0"/>
+              </a:p>
+            </p:txBody>
+          </p:sp>
+          <p:sp>
+            <p:nvSpPr>
+              <p:cNvPr id="59" name="TextBox 58"/>
+              <p:cNvSpPr txBox="1"/>
+              <p:nvPr/>
+            </p:nvSpPr>
+            <p:spPr>
+              <a:xfrm>
+                <a:off x="5430928" y="5188134"/>
+                <a:ext cx="867866" cy="461665"/>
+              </a:xfrm>
+              <a:prstGeom prst="rect">
+                <a:avLst/>
+              </a:prstGeom>
+              <a:noFill/>
+            </p:spPr>
+            <p:txBody>
+              <a:bodyPr wrap="square" rtlCol="0">
+                <a:spAutoFit/>
+              </a:bodyPr>
+              <a:lstStyle/>
+              <a:p>
+                <a:pPr algn="ctr"/>
+                <a:r>
+                  <a:rPr lang="en-US" sz="1200" b="1" dirty="0" smtClean="0"/>
+                  <a:t>Processing</a:t>
+                </a:r>
+                <a:br>
+                  <a:rPr lang="en-US" sz="1200" b="1" dirty="0" smtClean="0"/>
+                </a:br>
+                <a:r>
+                  <a:rPr lang="en-US" sz="1200" b="1" dirty="0" smtClean="0"/>
+                  <a:t>Integrity</a:t>
+                </a:r>
+                <a:endParaRPr lang="en-US" sz="1200" b="1" dirty="0"/>
+              </a:p>
+            </p:txBody>
+          </p:sp>
+          <p:sp>
+            <p:nvSpPr>
+              <p:cNvPr id="60" name="TextBox 59"/>
+              <p:cNvSpPr txBox="1"/>
+              <p:nvPr/>
+            </p:nvSpPr>
+            <p:spPr>
+              <a:xfrm>
+                <a:off x="5307635" y="3363164"/>
+                <a:ext cx="1133186" cy="276999"/>
+              </a:xfrm>
+              <a:prstGeom prst="rect">
+                <a:avLst/>
+              </a:prstGeom>
+              <a:noFill/>
+            </p:spPr>
+            <p:txBody>
+              <a:bodyPr wrap="square" rtlCol="0">
+                <a:spAutoFit/>
+              </a:bodyPr>
+              <a:lstStyle/>
+              <a:p>
+                <a:pPr algn="ctr"/>
+                <a:r>
+                  <a:rPr lang="en-US" sz="1200" b="1" dirty="0" smtClean="0"/>
+                  <a:t>Confidentiality</a:t>
+                </a:r>
+                <a:endParaRPr lang="en-US" sz="1200" b="1" dirty="0"/>
+              </a:p>
+            </p:txBody>
+          </p:sp>
+          <p:sp>
+            <p:nvSpPr>
+              <p:cNvPr id="43" name="TextBox 42"/>
+              <p:cNvSpPr txBox="1"/>
+              <p:nvPr/>
+            </p:nvSpPr>
+            <p:spPr>
+              <a:xfrm>
+                <a:off x="3798059" y="5561830"/>
+                <a:ext cx="1389955" cy="276999"/>
+              </a:xfrm>
+              <a:prstGeom prst="rect">
+                <a:avLst/>
+              </a:prstGeom>
+              <a:noFill/>
+            </p:spPr>
+            <p:txBody>
+              <a:bodyPr wrap="square" rtlCol="0">
+                <a:spAutoFit/>
+              </a:bodyPr>
+              <a:lstStyle/>
+              <a:p>
+                <a:pPr algn="ctr"/>
+                <a:r>
+                  <a:rPr lang="en-US" sz="1200" b="1" dirty="0" smtClean="0"/>
+                  <a:t>E n v I r o n m e n t</a:t>
+                </a:r>
+                <a:endParaRPr lang="en-US" sz="1200" b="1" dirty="0"/>
+              </a:p>
+            </p:txBody>
+          </p:sp>
+        </p:grpSp>
+      </p:grpSp>
+    </p:spTree>
+    <p:extLst>
+      <p:ext uri="{BB962C8B-B14F-4D97-AF65-F5344CB8AC3E}">
+        <p14:creationId xmlns:p14="http://schemas.microsoft.com/office/powerpoint/2010/main" val="889497670"/>
+      </p:ext>
+    </p:extLst>
+  </p:cSld>
+  <p:clrMapOvr>
+    <a:masterClrMapping/>
+  </p:clrMapOvr>
+</p:sld>
+</file>
+
 <file path=ppt/slides/slide2.xml><?xml version="1.0" encoding="utf-8"?>
 <p:sld xmlns:a="http://schemas.openxmlformats.org/drawingml/2006/main" xmlns:r="http://schemas.openxmlformats.org/officeDocument/2006/relationships" xmlns:p="http://schemas.openxmlformats.org/presentationml/2006/main">
   <p:cSld>

</xml_diff>